<commit_message>
update grafiken asp exp ratio winkel
</commit_message>
<xml_diff>
--- a/Präsentation/Abschluss_Präsentation_Markus.pptx
+++ b/Präsentation/Abschluss_Präsentation_Markus.pptx
@@ -18,7 +18,7 @@
     <p:sldId id="269" r:id="rId7"/>
     <p:sldId id="270" r:id="rId8"/>
     <p:sldId id="271" r:id="rId9"/>
-    <p:sldId id="272" r:id="rId10"/>
+    <p:sldId id="286" r:id="rId10"/>
     <p:sldId id="283" r:id="rId11"/>
     <p:sldId id="284" r:id="rId12"/>
     <p:sldId id="285" r:id="rId13"/>
@@ -3910,7 +3910,7 @@
     </p:spTree>
     <p:extLst>
       <p:ext uri="{BB962C8B-B14F-4D97-AF65-F5344CB8AC3E}">
-        <p14:creationId xmlns:p14="http://schemas.microsoft.com/office/powerpoint/2010/main" val="3915813997"/>
+        <p14:creationId xmlns:p14="http://schemas.microsoft.com/office/powerpoint/2010/main" val="1408466406"/>
       </p:ext>
     </p:extLst>
   </p:cSld>
@@ -7298,7 +7298,7 @@
           <p:cNvPr id="4" name="Grafik 3">
             <a:extLst>
               <a:ext uri="{FF2B5EF4-FFF2-40B4-BE49-F238E27FC236}">
-                <a16:creationId xmlns:a16="http://schemas.microsoft.com/office/drawing/2014/main" xmlns="" id="{18A4F8C9-BC47-4597-A341-7BD061B63621}"/>
+                <a16:creationId xmlns="" xmlns:a16="http://schemas.microsoft.com/office/drawing/2014/main" id="{18A4F8C9-BC47-4597-A341-7BD061B63621}"/>
               </a:ext>
             </a:extLst>
           </p:cNvPr>
@@ -7328,7 +7328,7 @@
           <p:cNvPr id="8" name="Gerade Verbindung mit Pfeil 7">
             <a:extLst>
               <a:ext uri="{FF2B5EF4-FFF2-40B4-BE49-F238E27FC236}">
-                <a16:creationId xmlns:a16="http://schemas.microsoft.com/office/drawing/2014/main" xmlns="" id="{6AEE5332-9F2B-40A4-B03C-0CA4C32B5711}"/>
+                <a16:creationId xmlns="" xmlns:a16="http://schemas.microsoft.com/office/drawing/2014/main" id="{6AEE5332-9F2B-40A4-B03C-0CA4C32B5711}"/>
               </a:ext>
             </a:extLst>
           </p:cNvPr>
@@ -7372,7 +7372,7 @@
           <p:cNvPr id="9" name="Rechteck 8">
             <a:extLst>
               <a:ext uri="{FF2B5EF4-FFF2-40B4-BE49-F238E27FC236}">
-                <a16:creationId xmlns:a16="http://schemas.microsoft.com/office/drawing/2014/main" xmlns="" id="{3778A54C-BCC7-4667-8D22-D645A2858F58}"/>
+                <a16:creationId xmlns="" xmlns:a16="http://schemas.microsoft.com/office/drawing/2014/main" id="{3778A54C-BCC7-4667-8D22-D645A2858F58}"/>
               </a:ext>
             </a:extLst>
           </p:cNvPr>
@@ -7461,7 +7461,7 @@
           <p:cNvPr id="2" name="Titel 1">
             <a:extLst>
               <a:ext uri="{FF2B5EF4-FFF2-40B4-BE49-F238E27FC236}">
-                <a16:creationId xmlns:a16="http://schemas.microsoft.com/office/drawing/2014/main" xmlns="" id="{094F379C-23F4-4D35-86D6-1D1C29CAB88B}"/>
+                <a16:creationId xmlns="" xmlns:a16="http://schemas.microsoft.com/office/drawing/2014/main" id="{094F379C-23F4-4D35-86D6-1D1C29CAB88B}"/>
               </a:ext>
             </a:extLst>
           </p:cNvPr>
@@ -7494,7 +7494,7 @@
           <p:cNvPr id="3" name="Inhaltsplatzhalter 2">
             <a:extLst>
               <a:ext uri="{FF2B5EF4-FFF2-40B4-BE49-F238E27FC236}">
-                <a16:creationId xmlns:a16="http://schemas.microsoft.com/office/drawing/2014/main" xmlns="" id="{1C3E671A-136E-4360-89A9-AD9DB1ED1606}"/>
+                <a16:creationId xmlns="" xmlns:a16="http://schemas.microsoft.com/office/drawing/2014/main" id="{1C3E671A-136E-4360-89A9-AD9DB1ED1606}"/>
               </a:ext>
             </a:extLst>
           </p:cNvPr>
@@ -7573,7 +7573,7 @@
           <p:cNvPr id="5" name="Inhaltsplatzhalter 3">
             <a:extLst>
               <a:ext uri="{FF2B5EF4-FFF2-40B4-BE49-F238E27FC236}">
-                <a16:creationId xmlns:a16="http://schemas.microsoft.com/office/drawing/2014/main" xmlns="" id="{9BE0C4F1-2D7A-4179-9985-55CFEF4AB9EA}"/>
+                <a16:creationId xmlns="" xmlns:a16="http://schemas.microsoft.com/office/drawing/2014/main" id="{9BE0C4F1-2D7A-4179-9985-55CFEF4AB9EA}"/>
               </a:ext>
             </a:extLst>
           </p:cNvPr>
@@ -7602,21 +7602,21 @@
                 <a:gridCol w="2470654">
                   <a:extLst>
                     <a:ext uri="{9D8B030D-6E8A-4147-A177-3AD203B41FA5}">
-                      <a16:colId xmlns:a16="http://schemas.microsoft.com/office/drawing/2014/main" xmlns="" val="20000"/>
+                      <a16:colId xmlns="" xmlns:a16="http://schemas.microsoft.com/office/drawing/2014/main" val="20000"/>
                     </a:ext>
                   </a:extLst>
                 </a:gridCol>
                 <a:gridCol w="1417779">
                   <a:extLst>
                     <a:ext uri="{9D8B030D-6E8A-4147-A177-3AD203B41FA5}">
-                      <a16:colId xmlns:a16="http://schemas.microsoft.com/office/drawing/2014/main" xmlns="" val="20001"/>
+                      <a16:colId xmlns="" xmlns:a16="http://schemas.microsoft.com/office/drawing/2014/main" val="20001"/>
                     </a:ext>
                   </a:extLst>
                 </a:gridCol>
                 <a:gridCol w="1512168">
                   <a:extLst>
                     <a:ext uri="{9D8B030D-6E8A-4147-A177-3AD203B41FA5}">
-                      <a16:colId xmlns:a16="http://schemas.microsoft.com/office/drawing/2014/main" xmlns="" val="2974703479"/>
+                      <a16:colId xmlns="" xmlns:a16="http://schemas.microsoft.com/office/drawing/2014/main" val="2974703479"/>
                     </a:ext>
                   </a:extLst>
                 </a:gridCol>
@@ -7697,7 +7697,7 @@
                 </a:tc>
                 <a:extLst>
                   <a:ext uri="{0D108BD9-81ED-4DB2-BD59-A6C34878D82A}">
-                    <a16:rowId xmlns:a16="http://schemas.microsoft.com/office/drawing/2014/main" xmlns="" val="10000"/>
+                    <a16:rowId xmlns="" xmlns:a16="http://schemas.microsoft.com/office/drawing/2014/main" val="10000"/>
                   </a:ext>
                 </a:extLst>
               </a:tr>
@@ -7762,7 +7762,7 @@
                 </a:tc>
                 <a:extLst>
                   <a:ext uri="{0D108BD9-81ED-4DB2-BD59-A6C34878D82A}">
-                    <a16:rowId xmlns:a16="http://schemas.microsoft.com/office/drawing/2014/main" xmlns="" val="10001"/>
+                    <a16:rowId xmlns="" xmlns:a16="http://schemas.microsoft.com/office/drawing/2014/main" val="10001"/>
                   </a:ext>
                 </a:extLst>
               </a:tr>
@@ -7844,7 +7844,7 @@
                 </a:tc>
                 <a:extLst>
                   <a:ext uri="{0D108BD9-81ED-4DB2-BD59-A6C34878D82A}">
-                    <a16:rowId xmlns:a16="http://schemas.microsoft.com/office/drawing/2014/main" xmlns="" val="10002"/>
+                    <a16:rowId xmlns="" xmlns:a16="http://schemas.microsoft.com/office/drawing/2014/main" val="10002"/>
                   </a:ext>
                 </a:extLst>
               </a:tr>
@@ -7922,7 +7922,7 @@
                 </a:tc>
                 <a:extLst>
                   <a:ext uri="{0D108BD9-81ED-4DB2-BD59-A6C34878D82A}">
-                    <a16:rowId xmlns:a16="http://schemas.microsoft.com/office/drawing/2014/main" xmlns="" val="10003"/>
+                    <a16:rowId xmlns="" xmlns:a16="http://schemas.microsoft.com/office/drawing/2014/main" val="10003"/>
                   </a:ext>
                 </a:extLst>
               </a:tr>
@@ -7965,7 +7965,7 @@
           <p:cNvPr id="2" name="Titel 1">
             <a:extLst>
               <a:ext uri="{FF2B5EF4-FFF2-40B4-BE49-F238E27FC236}">
-                <a16:creationId xmlns:a16="http://schemas.microsoft.com/office/drawing/2014/main" xmlns="" id="{094F379C-23F4-4D35-86D6-1D1C29CAB88B}"/>
+                <a16:creationId xmlns="" xmlns:a16="http://schemas.microsoft.com/office/drawing/2014/main" id="{094F379C-23F4-4D35-86D6-1D1C29CAB88B}"/>
               </a:ext>
             </a:extLst>
           </p:cNvPr>
@@ -8087,7 +8087,7 @@
           <p:cNvPr id="2" name="Titel 1">
             <a:extLst>
               <a:ext uri="{FF2B5EF4-FFF2-40B4-BE49-F238E27FC236}">
-                <a16:creationId xmlns:a16="http://schemas.microsoft.com/office/drawing/2014/main" xmlns="" id="{E94AB448-E08C-4FC1-AAC0-98431019A5B8}"/>
+                <a16:creationId xmlns="" xmlns:a16="http://schemas.microsoft.com/office/drawing/2014/main" id="{E94AB448-E08C-4FC1-AAC0-98431019A5B8}"/>
               </a:ext>
             </a:extLst>
           </p:cNvPr>
@@ -8120,7 +8120,7 @@
           <p:cNvPr id="3" name="Inhaltsplatzhalter 2">
             <a:extLst>
               <a:ext uri="{FF2B5EF4-FFF2-40B4-BE49-F238E27FC236}">
-                <a16:creationId xmlns:a16="http://schemas.microsoft.com/office/drawing/2014/main" xmlns="" id="{EE905004-B708-4F44-A14B-50934B89FAB0}"/>
+                <a16:creationId xmlns="" xmlns:a16="http://schemas.microsoft.com/office/drawing/2014/main" id="{EE905004-B708-4F44-A14B-50934B89FAB0}"/>
               </a:ext>
             </a:extLst>
           </p:cNvPr>
@@ -8238,7 +8238,7 @@
           <p:cNvPr id="2" name="Titel 1">
             <a:extLst>
               <a:ext uri="{FF2B5EF4-FFF2-40B4-BE49-F238E27FC236}">
-                <a16:creationId xmlns:a16="http://schemas.microsoft.com/office/drawing/2014/main" xmlns="" id="{98E30EB0-62A0-4D55-AF97-782AB848AE3B}"/>
+                <a16:creationId xmlns="" xmlns:a16="http://schemas.microsoft.com/office/drawing/2014/main" id="{98E30EB0-62A0-4D55-AF97-782AB848AE3B}"/>
               </a:ext>
             </a:extLst>
           </p:cNvPr>
@@ -8266,7 +8266,7 @@
           <p:cNvPr id="3" name="Inhaltsplatzhalter 2">
             <a:extLst>
               <a:ext uri="{FF2B5EF4-FFF2-40B4-BE49-F238E27FC236}">
-                <a16:creationId xmlns:a16="http://schemas.microsoft.com/office/drawing/2014/main" xmlns="" id="{5CE73134-BC2B-467B-B2FE-58257A89BDB4}"/>
+                <a16:creationId xmlns="" xmlns:a16="http://schemas.microsoft.com/office/drawing/2014/main" id="{5CE73134-BC2B-467B-B2FE-58257A89BDB4}"/>
               </a:ext>
             </a:extLst>
           </p:cNvPr>
@@ -8321,7 +8321,7 @@
           <p:cNvPr id="2" name="Titel 1">
             <a:extLst>
               <a:ext uri="{FF2B5EF4-FFF2-40B4-BE49-F238E27FC236}">
-                <a16:creationId xmlns:a16="http://schemas.microsoft.com/office/drawing/2014/main" xmlns="" id="{92BC8844-D44E-4A34-A3E9-BBC46793D01F}"/>
+                <a16:creationId xmlns="" xmlns:a16="http://schemas.microsoft.com/office/drawing/2014/main" id="{92BC8844-D44E-4A34-A3E9-BBC46793D01F}"/>
               </a:ext>
             </a:extLst>
           </p:cNvPr>
@@ -8349,7 +8349,7 @@
           <p:cNvPr id="3" name="Inhaltsplatzhalter 2">
             <a:extLst>
               <a:ext uri="{FF2B5EF4-FFF2-40B4-BE49-F238E27FC236}">
-                <a16:creationId xmlns:a16="http://schemas.microsoft.com/office/drawing/2014/main" xmlns="" id="{226BDF4D-EA65-4EB5-9166-5B6F009BEDE8}"/>
+                <a16:creationId xmlns="" xmlns:a16="http://schemas.microsoft.com/office/drawing/2014/main" id="{226BDF4D-EA65-4EB5-9166-5B6F009BEDE8}"/>
               </a:ext>
             </a:extLst>
           </p:cNvPr>
@@ -8407,7 +8407,7 @@
           <p:cNvPr id="2" name="Titel 1">
             <a:extLst>
               <a:ext uri="{FF2B5EF4-FFF2-40B4-BE49-F238E27FC236}">
-                <a16:creationId xmlns:a16="http://schemas.microsoft.com/office/drawing/2014/main" xmlns="" id="{B021C1F3-433C-41E3-8587-65D5BDA4F317}"/>
+                <a16:creationId xmlns="" xmlns:a16="http://schemas.microsoft.com/office/drawing/2014/main" id="{B021C1F3-433C-41E3-8587-65D5BDA4F317}"/>
               </a:ext>
             </a:extLst>
           </p:cNvPr>
@@ -8435,7 +8435,7 @@
           <p:cNvPr id="3" name="Inhaltsplatzhalter 2">
             <a:extLst>
               <a:ext uri="{FF2B5EF4-FFF2-40B4-BE49-F238E27FC236}">
-                <a16:creationId xmlns:a16="http://schemas.microsoft.com/office/drawing/2014/main" xmlns="" id="{CF5061C2-25E2-4A53-BCDE-093C837A0F45}"/>
+                <a16:creationId xmlns="" xmlns:a16="http://schemas.microsoft.com/office/drawing/2014/main" id="{CF5061C2-25E2-4A53-BCDE-093C837A0F45}"/>
               </a:ext>
             </a:extLst>
           </p:cNvPr>
@@ -8493,7 +8493,7 @@
           <p:cNvPr id="2" name="Titel 1">
             <a:extLst>
               <a:ext uri="{FF2B5EF4-FFF2-40B4-BE49-F238E27FC236}">
-                <a16:creationId xmlns:a16="http://schemas.microsoft.com/office/drawing/2014/main" xmlns="" id="{D329A526-CE1D-48AD-8C37-10B31DD1A94A}"/>
+                <a16:creationId xmlns="" xmlns:a16="http://schemas.microsoft.com/office/drawing/2014/main" id="{D329A526-CE1D-48AD-8C37-10B31DD1A94A}"/>
               </a:ext>
             </a:extLst>
           </p:cNvPr>
@@ -8521,7 +8521,7 @@
           <p:cNvPr id="3" name="Inhaltsplatzhalter 2">
             <a:extLst>
               <a:ext uri="{FF2B5EF4-FFF2-40B4-BE49-F238E27FC236}">
-                <a16:creationId xmlns:a16="http://schemas.microsoft.com/office/drawing/2014/main" xmlns="" id="{BA4C428F-6F17-477B-9503-2C9FE4D7286D}"/>
+                <a16:creationId xmlns="" xmlns:a16="http://schemas.microsoft.com/office/drawing/2014/main" id="{BA4C428F-6F17-477B-9503-2C9FE4D7286D}"/>
               </a:ext>
             </a:extLst>
           </p:cNvPr>
@@ -8593,7 +8593,7 @@
           <p:cNvPr id="2" name="Titel 1">
             <a:extLst>
               <a:ext uri="{FF2B5EF4-FFF2-40B4-BE49-F238E27FC236}">
-                <a16:creationId xmlns:a16="http://schemas.microsoft.com/office/drawing/2014/main" xmlns="" id="{8643BECD-9FC8-4139-AF9D-AAB9BD9ABF1F}"/>
+                <a16:creationId xmlns="" xmlns:a16="http://schemas.microsoft.com/office/drawing/2014/main" id="{8643BECD-9FC8-4139-AF9D-AAB9BD9ABF1F}"/>
               </a:ext>
             </a:extLst>
           </p:cNvPr>
@@ -8621,7 +8621,7 @@
           <p:cNvPr id="3" name="Inhaltsplatzhalter 2">
             <a:extLst>
               <a:ext uri="{FF2B5EF4-FFF2-40B4-BE49-F238E27FC236}">
-                <a16:creationId xmlns:a16="http://schemas.microsoft.com/office/drawing/2014/main" xmlns="" id="{E42A3100-1EC4-4CA1-8073-DBF9AE2DE022}"/>
+                <a16:creationId xmlns="" xmlns:a16="http://schemas.microsoft.com/office/drawing/2014/main" id="{E42A3100-1EC4-4CA1-8073-DBF9AE2DE022}"/>
               </a:ext>
             </a:extLst>
           </p:cNvPr>
@@ -8679,7 +8679,7 @@
           <p:cNvPr id="2" name="Titel 1">
             <a:extLst>
               <a:ext uri="{FF2B5EF4-FFF2-40B4-BE49-F238E27FC236}">
-                <a16:creationId xmlns:a16="http://schemas.microsoft.com/office/drawing/2014/main" xmlns="" id="{A6803A1C-048A-4BD5-BB5C-6AD0F129ECC9}"/>
+                <a16:creationId xmlns="" xmlns:a16="http://schemas.microsoft.com/office/drawing/2014/main" id="{A6803A1C-048A-4BD5-BB5C-6AD0F129ECC9}"/>
               </a:ext>
             </a:extLst>
           </p:cNvPr>
@@ -8707,7 +8707,7 @@
           <p:cNvPr id="3" name="Inhaltsplatzhalter 2">
             <a:extLst>
               <a:ext uri="{FF2B5EF4-FFF2-40B4-BE49-F238E27FC236}">
-                <a16:creationId xmlns:a16="http://schemas.microsoft.com/office/drawing/2014/main" xmlns="" id="{13708A06-7247-4796-B127-BA1268EFB4F0}"/>
+                <a16:creationId xmlns="" xmlns:a16="http://schemas.microsoft.com/office/drawing/2014/main" id="{13708A06-7247-4796-B127-BA1268EFB4F0}"/>
               </a:ext>
             </a:extLst>
           </p:cNvPr>
@@ -8801,7 +8801,7 @@
           <p:cNvPr id="2" name="Titel 1">
             <a:extLst>
               <a:ext uri="{FF2B5EF4-FFF2-40B4-BE49-F238E27FC236}">
-                <a16:creationId xmlns:a16="http://schemas.microsoft.com/office/drawing/2014/main" xmlns="" id="{D27A44A1-7D5C-4ED1-B1CC-16A1827DE5CE}"/>
+                <a16:creationId xmlns="" xmlns:a16="http://schemas.microsoft.com/office/drawing/2014/main" id="{D27A44A1-7D5C-4ED1-B1CC-16A1827DE5CE}"/>
               </a:ext>
             </a:extLst>
           </p:cNvPr>
@@ -8829,7 +8829,7 @@
           <p:cNvPr id="3" name="Inhaltsplatzhalter 2">
             <a:extLst>
               <a:ext uri="{FF2B5EF4-FFF2-40B4-BE49-F238E27FC236}">
-                <a16:creationId xmlns:a16="http://schemas.microsoft.com/office/drawing/2014/main" xmlns="" id="{0A11E94A-080C-4F4A-B9ED-FC1B878B8CE0}"/>
+                <a16:creationId xmlns="" xmlns:a16="http://schemas.microsoft.com/office/drawing/2014/main" id="{0A11E94A-080C-4F4A-B9ED-FC1B878B8CE0}"/>
               </a:ext>
             </a:extLst>
           </p:cNvPr>
@@ -9178,14 +9178,14 @@
                 <a:gridCol w="3411538">
                   <a:extLst>
                     <a:ext uri="{9D8B030D-6E8A-4147-A177-3AD203B41FA5}">
-                      <a16:colId xmlns:a16="http://schemas.microsoft.com/office/drawing/2014/main" xmlns="" val="20000"/>
+                      <a16:colId xmlns="" xmlns:a16="http://schemas.microsoft.com/office/drawing/2014/main" val="20000"/>
                     </a:ext>
                   </a:extLst>
                 </a:gridCol>
                 <a:gridCol w="3411538">
                   <a:extLst>
                     <a:ext uri="{9D8B030D-6E8A-4147-A177-3AD203B41FA5}">
-                      <a16:colId xmlns:a16="http://schemas.microsoft.com/office/drawing/2014/main" xmlns="" val="20001"/>
+                      <a16:colId xmlns="" xmlns:a16="http://schemas.microsoft.com/office/drawing/2014/main" val="20001"/>
                     </a:ext>
                   </a:extLst>
                 </a:gridCol>
@@ -9227,7 +9227,7 @@
                 </a:tc>
                 <a:extLst>
                   <a:ext uri="{0D108BD9-81ED-4DB2-BD59-A6C34878D82A}">
-                    <a16:rowId xmlns:a16="http://schemas.microsoft.com/office/drawing/2014/main" xmlns="" val="10000"/>
+                    <a16:rowId xmlns="" xmlns:a16="http://schemas.microsoft.com/office/drawing/2014/main" val="10000"/>
                   </a:ext>
                 </a:extLst>
               </a:tr>
@@ -9265,7 +9265,7 @@
                 </a:tc>
                 <a:extLst>
                   <a:ext uri="{0D108BD9-81ED-4DB2-BD59-A6C34878D82A}">
-                    <a16:rowId xmlns:a16="http://schemas.microsoft.com/office/drawing/2014/main" xmlns="" val="10001"/>
+                    <a16:rowId xmlns="" xmlns:a16="http://schemas.microsoft.com/office/drawing/2014/main" val="10001"/>
                   </a:ext>
                 </a:extLst>
               </a:tr>
@@ -9319,7 +9319,7 @@
                 </a:tc>
                 <a:extLst>
                   <a:ext uri="{0D108BD9-81ED-4DB2-BD59-A6C34878D82A}">
-                    <a16:rowId xmlns:a16="http://schemas.microsoft.com/office/drawing/2014/main" xmlns="" val="10002"/>
+                    <a16:rowId xmlns="" xmlns:a16="http://schemas.microsoft.com/office/drawing/2014/main" val="10002"/>
                   </a:ext>
                 </a:extLst>
               </a:tr>
@@ -9373,7 +9373,7 @@
                 </a:tc>
                 <a:extLst>
                   <a:ext uri="{0D108BD9-81ED-4DB2-BD59-A6C34878D82A}">
-                    <a16:rowId xmlns:a16="http://schemas.microsoft.com/office/drawing/2014/main" xmlns="" val="10003"/>
+                    <a16:rowId xmlns="" xmlns:a16="http://schemas.microsoft.com/office/drawing/2014/main" val="10003"/>
                   </a:ext>
                 </a:extLst>
               </a:tr>
@@ -9427,7 +9427,7 @@
                 </a:tc>
                 <a:extLst>
                   <a:ext uri="{0D108BD9-81ED-4DB2-BD59-A6C34878D82A}">
-                    <a16:rowId xmlns:a16="http://schemas.microsoft.com/office/drawing/2014/main" xmlns="" val="10004"/>
+                    <a16:rowId xmlns="" xmlns:a16="http://schemas.microsoft.com/office/drawing/2014/main" val="10004"/>
                   </a:ext>
                 </a:extLst>
               </a:tr>
@@ -9481,7 +9481,7 @@
                 </a:tc>
                 <a:extLst>
                   <a:ext uri="{0D108BD9-81ED-4DB2-BD59-A6C34878D82A}">
-                    <a16:rowId xmlns:a16="http://schemas.microsoft.com/office/drawing/2014/main" xmlns="" val="10005"/>
+                    <a16:rowId xmlns="" xmlns:a16="http://schemas.microsoft.com/office/drawing/2014/main" val="10005"/>
                   </a:ext>
                 </a:extLst>
               </a:tr>
@@ -9535,7 +9535,7 @@
                 </a:tc>
                 <a:extLst>
                   <a:ext uri="{0D108BD9-81ED-4DB2-BD59-A6C34878D82A}">
-                    <a16:rowId xmlns:a16="http://schemas.microsoft.com/office/drawing/2014/main" xmlns="" val="10006"/>
+                    <a16:rowId xmlns="" xmlns:a16="http://schemas.microsoft.com/office/drawing/2014/main" val="10006"/>
                   </a:ext>
                 </a:extLst>
               </a:tr>
@@ -9589,7 +9589,7 @@
                 </a:tc>
                 <a:extLst>
                   <a:ext uri="{0D108BD9-81ED-4DB2-BD59-A6C34878D82A}">
-                    <a16:rowId xmlns:a16="http://schemas.microsoft.com/office/drawing/2014/main" xmlns="" val="10007"/>
+                    <a16:rowId xmlns="" xmlns:a16="http://schemas.microsoft.com/office/drawing/2014/main" val="10007"/>
                   </a:ext>
                 </a:extLst>
               </a:tr>
@@ -9812,7 +9812,7 @@
           <p:cNvPr id="2" name="Titel 1">
             <a:extLst>
               <a:ext uri="{FF2B5EF4-FFF2-40B4-BE49-F238E27FC236}">
-                <a16:creationId xmlns:a16="http://schemas.microsoft.com/office/drawing/2014/main" xmlns="" id="{097E6A6D-464E-4766-AAF3-C4FECB9FA991}"/>
+                <a16:creationId xmlns="" xmlns:a16="http://schemas.microsoft.com/office/drawing/2014/main" id="{097E6A6D-464E-4766-AAF3-C4FECB9FA991}"/>
               </a:ext>
             </a:extLst>
           </p:cNvPr>
@@ -9842,7 +9842,7 @@
               <p:cNvPr id="3" name="Inhaltsplatzhalter 2">
                 <a:extLst>
                   <a:ext uri="{FF2B5EF4-FFF2-40B4-BE49-F238E27FC236}">
-                    <a16:creationId xmlns:a16="http://schemas.microsoft.com/office/drawing/2014/main" xmlns="" id="{0E9598F0-1E7C-41F5-AC85-FE84123CF1DA}"/>
+                    <a16:creationId xmlns="" xmlns:a16="http://schemas.microsoft.com/office/drawing/2014/main" id="{0E9598F0-1E7C-41F5-AC85-FE84123CF1DA}"/>
                   </a:ext>
                 </a:extLst>
               </p:cNvPr>
@@ -11048,7 +11048,7 @@
           <p:cNvPr id="2" name="Titel 1">
             <a:extLst>
               <a:ext uri="{FF2B5EF4-FFF2-40B4-BE49-F238E27FC236}">
-                <a16:creationId xmlns:a16="http://schemas.microsoft.com/office/drawing/2014/main" xmlns="" id="{2466B14E-2CAE-450A-835B-07642C6772FC}"/>
+                <a16:creationId xmlns="" xmlns:a16="http://schemas.microsoft.com/office/drawing/2014/main" id="{2466B14E-2CAE-450A-835B-07642C6772FC}"/>
               </a:ext>
             </a:extLst>
           </p:cNvPr>
@@ -11076,7 +11076,7 @@
           <p:cNvPr id="3" name="Inhaltsplatzhalter 2">
             <a:extLst>
               <a:ext uri="{FF2B5EF4-FFF2-40B4-BE49-F238E27FC236}">
-                <a16:creationId xmlns:a16="http://schemas.microsoft.com/office/drawing/2014/main" xmlns="" id="{CCE11E07-3335-434C-8B03-5B1BAEAEC7C5}"/>
+                <a16:creationId xmlns="" xmlns:a16="http://schemas.microsoft.com/office/drawing/2014/main" id="{CCE11E07-3335-434C-8B03-5B1BAEAEC7C5}"/>
               </a:ext>
             </a:extLst>
           </p:cNvPr>
@@ -11150,7 +11150,7 @@
           <p:cNvPr id="2" name="Titel 1">
             <a:extLst>
               <a:ext uri="{FF2B5EF4-FFF2-40B4-BE49-F238E27FC236}">
-                <a16:creationId xmlns:a16="http://schemas.microsoft.com/office/drawing/2014/main" xmlns="" id="{B0EB02CB-0053-457A-BB5F-5D64278141CC}"/>
+                <a16:creationId xmlns="" xmlns:a16="http://schemas.microsoft.com/office/drawing/2014/main" id="{B0EB02CB-0053-457A-BB5F-5D64278141CC}"/>
               </a:ext>
             </a:extLst>
           </p:cNvPr>
@@ -11178,7 +11178,7 @@
           <p:cNvPr id="3" name="Inhaltsplatzhalter 2">
             <a:extLst>
               <a:ext uri="{FF2B5EF4-FFF2-40B4-BE49-F238E27FC236}">
-                <a16:creationId xmlns:a16="http://schemas.microsoft.com/office/drawing/2014/main" xmlns="" id="{756355A6-13F9-40C1-8AD3-1534717E7B09}"/>
+                <a16:creationId xmlns="" xmlns:a16="http://schemas.microsoft.com/office/drawing/2014/main" id="{756355A6-13F9-40C1-8AD3-1534717E7B09}"/>
               </a:ext>
             </a:extLst>
           </p:cNvPr>
@@ -11240,7 +11240,7 @@
           <p:cNvPr id="2" name="Titel 1">
             <a:extLst>
               <a:ext uri="{FF2B5EF4-FFF2-40B4-BE49-F238E27FC236}">
-                <a16:creationId xmlns:a16="http://schemas.microsoft.com/office/drawing/2014/main" xmlns="" id="{8DE61EE4-0A2E-4DFD-BE73-F3D4D2210025}"/>
+                <a16:creationId xmlns="" xmlns:a16="http://schemas.microsoft.com/office/drawing/2014/main" id="{8DE61EE4-0A2E-4DFD-BE73-F3D4D2210025}"/>
               </a:ext>
             </a:extLst>
           </p:cNvPr>
@@ -11268,7 +11268,7 @@
           <p:cNvPr id="3" name="Inhaltsplatzhalter 2">
             <a:extLst>
               <a:ext uri="{FF2B5EF4-FFF2-40B4-BE49-F238E27FC236}">
-                <a16:creationId xmlns:a16="http://schemas.microsoft.com/office/drawing/2014/main" xmlns="" id="{D3AA39F9-9931-48BD-9CE6-A9A42797156C}"/>
+                <a16:creationId xmlns="" xmlns:a16="http://schemas.microsoft.com/office/drawing/2014/main" id="{D3AA39F9-9931-48BD-9CE6-A9A42797156C}"/>
               </a:ext>
             </a:extLst>
           </p:cNvPr>
@@ -11323,7 +11323,7 @@
           <p:cNvPr id="2" name="Titel 1">
             <a:extLst>
               <a:ext uri="{FF2B5EF4-FFF2-40B4-BE49-F238E27FC236}">
-                <a16:creationId xmlns:a16="http://schemas.microsoft.com/office/drawing/2014/main" xmlns="" id="{5468A21C-5F1B-49A9-9615-E49303F1DFD8}"/>
+                <a16:creationId xmlns="" xmlns:a16="http://schemas.microsoft.com/office/drawing/2014/main" id="{5468A21C-5F1B-49A9-9615-E49303F1DFD8}"/>
               </a:ext>
             </a:extLst>
           </p:cNvPr>
@@ -11351,7 +11351,7 @@
           <p:cNvPr id="3" name="Inhaltsplatzhalter 2">
             <a:extLst>
               <a:ext uri="{FF2B5EF4-FFF2-40B4-BE49-F238E27FC236}">
-                <a16:creationId xmlns:a16="http://schemas.microsoft.com/office/drawing/2014/main" xmlns="" id="{71D6F8BC-B1F4-4464-B16C-BE0C1ED3F521}"/>
+                <a16:creationId xmlns="" xmlns:a16="http://schemas.microsoft.com/office/drawing/2014/main" id="{71D6F8BC-B1F4-4464-B16C-BE0C1ED3F521}"/>
               </a:ext>
             </a:extLst>
           </p:cNvPr>
@@ -11412,6 +11412,14 @@
 <file path=ppt/slides/slide8.xml><?xml version="1.0" encoding="utf-8"?>
 <p:sld xmlns:a="http://schemas.openxmlformats.org/drawingml/2006/main" xmlns:r="http://schemas.openxmlformats.org/officeDocument/2006/relationships" xmlns:p="http://schemas.openxmlformats.org/presentationml/2006/main">
   <p:cSld>
+    <p:bg>
+      <p:bgPr>
+        <a:solidFill>
+          <a:schemeClr val="bg1"/>
+        </a:solidFill>
+        <a:effectLst/>
+      </p:bgPr>
+    </p:bg>
     <p:spTree>
       <p:nvGrpSpPr>
         <p:cNvPr id="1" name=""/>
@@ -11449,13 +11457,8 @@
           <a:p>
             <a:r>
               <a:rPr lang="de-DE" dirty="0"/>
-              <a:t>Aachen-Turbine: </a:t>
-            </a:r>
-            <a:r>
-              <a:rPr lang="de-DE" dirty="0" smtClean="0"/>
-              <a:t>Vorgehen (1)</a:t>
-            </a:r>
-            <a:endParaRPr lang="de-DE" dirty="0"/>
+              <a:t>Aachen-Turbine: Vorgehen (1)</a:t>
+            </a:r>
           </a:p>
         </p:txBody>
       </p:sp>
@@ -11478,7 +11481,7 @@
         <p:spPr>
           <a:xfrm>
             <a:off x="360000" y="1620001"/>
-            <a:ext cx="6823569" cy="4329280"/>
+            <a:ext cx="6823569" cy="3107756"/>
           </a:xfrm>
         </p:spPr>
         <p:txBody>
@@ -11486,32 +11489,124 @@
           <a:lstStyle/>
           <a:p>
             <a:r>
-              <a:rPr lang="de-DE" dirty="0" smtClean="0"/>
+              <a:rPr lang="de-DE" dirty="0"/>
               <a:t>Erstellung eines Referenzgitters mit AutoGrid5</a:t>
             </a:r>
           </a:p>
           <a:p>
             <a:r>
-              <a:rPr lang="de-DE" dirty="0" smtClean="0"/>
+              <a:rPr lang="de-DE" dirty="0"/>
               <a:t>Manuelle Optimierung für ausreichend gute Netzqualität:</a:t>
             </a:r>
           </a:p>
           <a:p>
             <a:pPr lvl="2"/>
             <a:r>
-              <a:rPr lang="de-DE" dirty="0" smtClean="0"/>
+              <a:rPr lang="de-DE" dirty="0"/>
               <a:t>Keine negativen Kontrollvolumen</a:t>
             </a:r>
           </a:p>
           <a:p>
             <a:pPr lvl="2"/>
             <a:r>
-              <a:rPr lang="de-DE" dirty="0" smtClean="0"/>
+              <a:rPr lang="de-DE" dirty="0"/>
               <a:t>Kleinster Winkel einer Zelle &gt; 20°</a:t>
             </a:r>
           </a:p>
           <a:p>
             <a:pPr lvl="2"/>
+            <a:r>
+              <a:rPr lang="de-DE" dirty="0"/>
+              <a:t>Expansion </a:t>
+            </a:r>
+            <a:r>
+              <a:rPr lang="de-DE" dirty="0" err="1"/>
+              <a:t>ratio</a:t>
+            </a:r>
+            <a:r>
+              <a:rPr lang="de-DE" dirty="0"/>
+              <a:t> &lt; 3</a:t>
+            </a:r>
+          </a:p>
+          <a:p>
+            <a:pPr lvl="2"/>
+            <a:r>
+              <a:rPr lang="de-DE" dirty="0" err="1"/>
+              <a:t>Aspect</a:t>
+            </a:r>
+            <a:r>
+              <a:rPr lang="de-DE" dirty="0"/>
+              <a:t> </a:t>
+            </a:r>
+            <a:r>
+              <a:rPr lang="de-DE" dirty="0" err="1"/>
+              <a:t>ratio</a:t>
+            </a:r>
+            <a:r>
+              <a:rPr lang="de-DE" dirty="0"/>
+              <a:t> &lt; 1500</a:t>
+            </a:r>
+          </a:p>
+          <a:p>
+            <a:r>
+              <a:rPr lang="de-DE" dirty="0"/>
+              <a:t>Spaltverfeinerung</a:t>
+            </a:r>
+          </a:p>
+        </p:txBody>
+      </p:sp>
+      <p:sp>
+        <p:nvSpPr>
+          <p:cNvPr id="5" name="Rechteck 4">
+            <a:extLst>
+              <a:ext uri="{FF2B5EF4-FFF2-40B4-BE49-F238E27FC236}">
+                <a16:creationId xmlns:a16="http://schemas.microsoft.com/office/drawing/2014/main" xmlns="" id="{100A8661-918C-422A-9F12-1449593EB770}"/>
+              </a:ext>
+            </a:extLst>
+          </p:cNvPr>
+          <p:cNvSpPr/>
+          <p:nvPr/>
+        </p:nvSpPr>
+        <p:spPr>
+          <a:xfrm>
+            <a:off x="2159732" y="4753477"/>
+            <a:ext cx="2160240" cy="1228956"/>
+          </a:xfrm>
+          <a:prstGeom prst="rect">
+            <a:avLst/>
+          </a:prstGeom>
+          <a:solidFill>
+            <a:srgbClr val="064E8A"/>
+          </a:solidFill>
+          <a:ln>
+            <a:solidFill>
+              <a:srgbClr val="001C26">
+                <a:alpha val="75000"/>
+              </a:srgbClr>
+            </a:solidFill>
+          </a:ln>
+        </p:spPr>
+        <p:style>
+          <a:lnRef idx="2">
+            <a:schemeClr val="accent1">
+              <a:shade val="50000"/>
+            </a:schemeClr>
+          </a:lnRef>
+          <a:fillRef idx="1">
+            <a:schemeClr val="accent1"/>
+          </a:fillRef>
+          <a:effectRef idx="0">
+            <a:schemeClr val="accent1"/>
+          </a:effectRef>
+          <a:fontRef idx="minor">
+            <a:schemeClr val="lt1"/>
+          </a:fontRef>
+        </p:style>
+        <p:txBody>
+          <a:bodyPr rtlCol="0" anchor="ctr"/>
+          <a:lstStyle/>
+          <a:p>
+            <a:pPr algn="ctr"/>
             <a:r>
               <a:rPr lang="de-DE" dirty="0" smtClean="0"/>
               <a:t>Expansion </a:t>
@@ -11524,9 +11619,103 @@
               <a:rPr lang="de-DE" dirty="0" smtClean="0"/>
               <a:t> &lt; 3</a:t>
             </a:r>
-          </a:p>
-          <a:p>
-            <a:pPr lvl="2"/>
+            <a:endParaRPr lang="de-DE" dirty="0"/>
+          </a:p>
+        </p:txBody>
+      </p:sp>
+      <p:cxnSp>
+        <p:nvCxnSpPr>
+          <p:cNvPr id="7" name="Gerader Verbinder 6">
+            <a:extLst>
+              <a:ext uri="{FF2B5EF4-FFF2-40B4-BE49-F238E27FC236}">
+                <a16:creationId xmlns:a16="http://schemas.microsoft.com/office/drawing/2014/main" xmlns="" id="{99319621-456B-4F9C-8AE3-990417BC162B}"/>
+              </a:ext>
+            </a:extLst>
+          </p:cNvPr>
+          <p:cNvCxnSpPr/>
+          <p:nvPr/>
+        </p:nvCxnSpPr>
+        <p:spPr>
+          <a:xfrm>
+            <a:off x="2159732" y="5157192"/>
+            <a:ext cx="2160240" cy="0"/>
+          </a:xfrm>
+          <a:prstGeom prst="line">
+            <a:avLst/>
+          </a:prstGeom>
+          <a:ln w="25400">
+            <a:solidFill>
+              <a:srgbClr val="FF0000"/>
+            </a:solidFill>
+          </a:ln>
+        </p:spPr>
+        <p:style>
+          <a:lnRef idx="1">
+            <a:schemeClr val="accent1"/>
+          </a:lnRef>
+          <a:fillRef idx="0">
+            <a:schemeClr val="accent1"/>
+          </a:fillRef>
+          <a:effectRef idx="0">
+            <a:schemeClr val="accent1"/>
+          </a:effectRef>
+          <a:fontRef idx="minor">
+            <a:schemeClr val="tx1"/>
+          </a:fontRef>
+        </p:style>
+      </p:cxnSp>
+      <p:sp>
+        <p:nvSpPr>
+          <p:cNvPr id="8" name="Rechteck 7">
+            <a:extLst>
+              <a:ext uri="{FF2B5EF4-FFF2-40B4-BE49-F238E27FC236}">
+                <a16:creationId xmlns:a16="http://schemas.microsoft.com/office/drawing/2014/main" xmlns="" id="{8524B71A-AA14-47C0-A247-D8BE9E17ACA5}"/>
+              </a:ext>
+            </a:extLst>
+          </p:cNvPr>
+          <p:cNvSpPr/>
+          <p:nvPr/>
+        </p:nvSpPr>
+        <p:spPr>
+          <a:xfrm>
+            <a:off x="5220072" y="5373216"/>
+            <a:ext cx="3600400" cy="659484"/>
+          </a:xfrm>
+          <a:prstGeom prst="rect">
+            <a:avLst/>
+          </a:prstGeom>
+          <a:solidFill>
+            <a:srgbClr val="064E8A"/>
+          </a:solidFill>
+          <a:ln>
+            <a:solidFill>
+              <a:srgbClr val="001C26">
+                <a:alpha val="75000"/>
+              </a:srgbClr>
+            </a:solidFill>
+          </a:ln>
+        </p:spPr>
+        <p:style>
+          <a:lnRef idx="2">
+            <a:schemeClr val="accent1">
+              <a:shade val="50000"/>
+            </a:schemeClr>
+          </a:lnRef>
+          <a:fillRef idx="1">
+            <a:schemeClr val="accent1"/>
+          </a:fillRef>
+          <a:effectRef idx="0">
+            <a:schemeClr val="accent1"/>
+          </a:effectRef>
+          <a:fontRef idx="minor">
+            <a:schemeClr val="lt1"/>
+          </a:fontRef>
+        </p:style>
+        <p:txBody>
+          <a:bodyPr rtlCol="0" anchor="ctr"/>
+          <a:lstStyle/>
+          <a:p>
+            <a:pPr algn="ctr"/>
             <a:r>
               <a:rPr lang="de-DE" dirty="0" err="1" smtClean="0"/>
               <a:t>Aspect</a:t>
@@ -11541,22 +11730,192 @@
             </a:r>
             <a:r>
               <a:rPr lang="de-DE" dirty="0" smtClean="0"/>
-              <a:t> &lt; 1500</a:t>
-            </a:r>
-          </a:p>
-          <a:p>
+              <a:t> </a:t>
+            </a:r>
             <a:r>
               <a:rPr lang="de-DE" dirty="0" smtClean="0"/>
-              <a:t>Spaltverfeinerung</a:t>
+              <a:t>&lt; 1500</a:t>
             </a:r>
             <a:endParaRPr lang="de-DE" dirty="0"/>
+          </a:p>
+        </p:txBody>
+      </p:sp>
+      <p:sp>
+        <p:nvSpPr>
+          <p:cNvPr id="10" name="Parallelogramm 9">
+            <a:extLst>
+              <a:ext uri="{FF2B5EF4-FFF2-40B4-BE49-F238E27FC236}">
+                <a16:creationId xmlns:a16="http://schemas.microsoft.com/office/drawing/2014/main" xmlns="" id="{F6BBA9AE-BA91-4C42-9E5C-0256A3AD969E}"/>
+              </a:ext>
+            </a:extLst>
+          </p:cNvPr>
+          <p:cNvSpPr/>
+          <p:nvPr/>
+        </p:nvSpPr>
+        <p:spPr>
+          <a:xfrm>
+            <a:off x="4788024" y="2924944"/>
+            <a:ext cx="3729073" cy="1152128"/>
+          </a:xfrm>
+          <a:prstGeom prst="parallelogram">
+            <a:avLst>
+              <a:gd name="adj" fmla="val 214936"/>
+            </a:avLst>
+          </a:prstGeom>
+          <a:solidFill>
+            <a:srgbClr val="064E8A"/>
+          </a:solidFill>
+          <a:ln>
+            <a:solidFill>
+              <a:schemeClr val="tx1">
+                <a:alpha val="75000"/>
+              </a:schemeClr>
+            </a:solidFill>
+          </a:ln>
+        </p:spPr>
+        <p:style>
+          <a:lnRef idx="2">
+            <a:schemeClr val="accent1">
+              <a:shade val="50000"/>
+            </a:schemeClr>
+          </a:lnRef>
+          <a:fillRef idx="1">
+            <a:schemeClr val="accent1"/>
+          </a:fillRef>
+          <a:effectRef idx="0">
+            <a:schemeClr val="accent1"/>
+          </a:effectRef>
+          <a:fontRef idx="minor">
+            <a:schemeClr val="lt1"/>
+          </a:fontRef>
+        </p:style>
+        <p:txBody>
+          <a:bodyPr rtlCol="0" anchor="ctr"/>
+          <a:lstStyle/>
+          <a:p>
+            <a:pPr algn="ctr"/>
+            <a:endParaRPr lang="de-DE"/>
+          </a:p>
+        </p:txBody>
+      </p:sp>
+      <p:sp>
+        <p:nvSpPr>
+          <p:cNvPr id="6" name="Bogen 5"/>
+          <p:cNvSpPr/>
+          <p:nvPr/>
+        </p:nvSpPr>
+        <p:spPr>
+          <a:xfrm>
+            <a:off x="5364088" y="3715726"/>
+            <a:ext cx="432048" cy="576064"/>
+          </a:xfrm>
+          <a:prstGeom prst="arc">
+            <a:avLst>
+              <a:gd name="adj1" fmla="val 16200000"/>
+              <a:gd name="adj2" fmla="val 903131"/>
+            </a:avLst>
+          </a:prstGeom>
+          <a:ln w="25400">
+            <a:solidFill>
+              <a:srgbClr val="FF0000"/>
+            </a:solidFill>
+          </a:ln>
+        </p:spPr>
+        <p:style>
+          <a:lnRef idx="1">
+            <a:schemeClr val="accent1"/>
+          </a:lnRef>
+          <a:fillRef idx="0">
+            <a:schemeClr val="accent1"/>
+          </a:fillRef>
+          <a:effectRef idx="0">
+            <a:schemeClr val="accent1"/>
+          </a:effectRef>
+          <a:fontRef idx="minor">
+            <a:schemeClr val="tx1"/>
+          </a:fontRef>
+        </p:style>
+        <p:txBody>
+          <a:bodyPr rtlCol="0" anchor="ctr"/>
+          <a:lstStyle/>
+          <a:p>
+            <a:pPr algn="ctr"/>
+            <a:endParaRPr lang="de-DE"/>
+          </a:p>
+        </p:txBody>
+      </p:sp>
+      <p:cxnSp>
+        <p:nvCxnSpPr>
+          <p:cNvPr id="13" name="Gerade Verbindung mit Pfeil 12"/>
+          <p:cNvCxnSpPr>
+            <a:stCxn id="17" idx="1"/>
+          </p:cNvCxnSpPr>
+          <p:nvPr/>
+        </p:nvCxnSpPr>
+        <p:spPr>
+          <a:xfrm flipH="1" flipV="1">
+            <a:off x="5580112" y="3882029"/>
+            <a:ext cx="317382" cy="652761"/>
+          </a:xfrm>
+          <a:prstGeom prst="straightConnector1">
+            <a:avLst/>
+          </a:prstGeom>
+          <a:ln w="25400">
+            <a:solidFill>
+              <a:srgbClr val="FF0000"/>
+            </a:solidFill>
+            <a:tailEnd type="triangle"/>
+          </a:ln>
+        </p:spPr>
+        <p:style>
+          <a:lnRef idx="1">
+            <a:schemeClr val="accent1"/>
+          </a:lnRef>
+          <a:fillRef idx="0">
+            <a:schemeClr val="accent1"/>
+          </a:fillRef>
+          <a:effectRef idx="0">
+            <a:schemeClr val="accent1"/>
+          </a:effectRef>
+          <a:fontRef idx="minor">
+            <a:schemeClr val="tx1"/>
+          </a:fontRef>
+        </p:style>
+      </p:cxnSp>
+      <p:sp>
+        <p:nvSpPr>
+          <p:cNvPr id="17" name="Textfeld 16"/>
+          <p:cNvSpPr txBox="1"/>
+          <p:nvPr/>
+        </p:nvSpPr>
+        <p:spPr>
+          <a:xfrm>
+            <a:off x="5897494" y="4350124"/>
+            <a:ext cx="1489510" cy="369332"/>
+          </a:xfrm>
+          <a:prstGeom prst="rect">
+            <a:avLst/>
+          </a:prstGeom>
+          <a:noFill/>
+        </p:spPr>
+        <p:txBody>
+          <a:bodyPr wrap="none" rtlCol="0">
+            <a:spAutoFit/>
+          </a:bodyPr>
+          <a:lstStyle/>
+          <a:p>
+            <a:r>
+              <a:rPr lang="de-DE" smtClean="0"/>
+              <a:t>Winkel &gt; 20°</a:t>
+            </a:r>
+            <a:endParaRPr lang="de-DE"/>
           </a:p>
         </p:txBody>
       </p:sp>
     </p:spTree>
     <p:extLst>
       <p:ext uri="{BB962C8B-B14F-4D97-AF65-F5344CB8AC3E}">
-        <p14:creationId xmlns:p14="http://schemas.microsoft.com/office/powerpoint/2010/main" val="378787473"/>
+        <p14:creationId xmlns:p14="http://schemas.microsoft.com/office/powerpoint/2010/main" val="1847428276"/>
       </p:ext>
     </p:extLst>
   </p:cSld>
@@ -11588,7 +11947,7 @@
           <p:cNvPr id="2" name="Titel 1">
             <a:extLst>
               <a:ext uri="{FF2B5EF4-FFF2-40B4-BE49-F238E27FC236}">
-                <a16:creationId xmlns:a16="http://schemas.microsoft.com/office/drawing/2014/main" xmlns="" id="{094F379C-23F4-4D35-86D6-1D1C29CAB88B}"/>
+                <a16:creationId xmlns="" xmlns:a16="http://schemas.microsoft.com/office/drawing/2014/main" id="{094F379C-23F4-4D35-86D6-1D1C29CAB88B}"/>
               </a:ext>
             </a:extLst>
           </p:cNvPr>
@@ -11623,7 +11982,7 @@
               <p:cNvPr id="3" name="Inhaltsplatzhalter 2">
                 <a:extLst>
                   <a:ext uri="{FF2B5EF4-FFF2-40B4-BE49-F238E27FC236}">
-                    <a16:creationId xmlns:a16="http://schemas.microsoft.com/office/drawing/2014/main" xmlns="" id="{1C3E671A-136E-4360-89A9-AD9DB1ED1606}"/>
+                    <a16:creationId xmlns="" xmlns:a16="http://schemas.microsoft.com/office/drawing/2014/main" id="{1C3E671A-136E-4360-89A9-AD9DB1ED1606}"/>
                   </a:ext>
                 </a:extLst>
               </p:cNvPr>

</xml_diff>